<commit_message>
Added section for Improving and for contact info at the end
</commit_message>
<xml_diff>
--- a/2023/5 Skills You Must Master.pptx
+++ b/2023/5 Skills You Must Master.pptx
@@ -4273,31 +4273,6 @@
           </a:p>
         </p:txBody>
       </p:sp>
-      <p:sp>
-        <p:nvSpPr>
-          <p:cNvPr id="3" name="Content Placeholder 2">
-            <a:extLst>
-              <a:ext uri="{FF2B5EF4-FFF2-40B4-BE49-F238E27FC236}">
-                <a16:creationId xmlns:a16="http://schemas.microsoft.com/office/drawing/2014/main" id="{16A3752E-6752-2C73-09CC-DC1E370A48D0}"/>
-              </a:ext>
-            </a:extLst>
-          </p:cNvPr>
-          <p:cNvSpPr>
-            <a:spLocks noGrp="1"/>
-          </p:cNvSpPr>
-          <p:nvPr>
-            <p:ph idx="1"/>
-          </p:nvPr>
-        </p:nvSpPr>
-        <p:spPr/>
-        <p:txBody>
-          <a:bodyPr/>
-          <a:lstStyle/>
-          <a:p>
-            <a:endParaRPr lang="en-US"/>
-          </a:p>
-        </p:txBody>
-      </p:sp>
     </p:spTree>
     <p:extLst>
       <p:ext uri="{BB962C8B-B14F-4D97-AF65-F5344CB8AC3E}">
@@ -4356,28 +4331,77 @@
           </a:p>
         </p:txBody>
       </p:sp>
-      <p:sp>
-        <p:nvSpPr>
-          <p:cNvPr id="3" name="Content Placeholder 2">
+      <p:pic>
+        <p:nvPicPr>
+          <p:cNvPr id="4" name="Content Placeholder 3">
             <a:extLst>
               <a:ext uri="{FF2B5EF4-FFF2-40B4-BE49-F238E27FC236}">
-                <a16:creationId xmlns:a16="http://schemas.microsoft.com/office/drawing/2014/main" id="{139DA638-3D46-71C7-8C35-08B901AB85F8}"/>
+                <a16:creationId xmlns:a16="http://schemas.microsoft.com/office/drawing/2014/main" id="{565EEB73-C4D1-2DA6-5C62-4C431E8ACE29}"/>
               </a:ext>
             </a:extLst>
           </p:cNvPr>
-          <p:cNvSpPr>
-            <a:spLocks noGrp="1"/>
-          </p:cNvSpPr>
+          <p:cNvPicPr>
+            <a:picLocks noGrp="1" noChangeAspect="1"/>
+          </p:cNvPicPr>
           <p:nvPr>
             <p:ph idx="1"/>
           </p:nvPr>
-        </p:nvSpPr>
-        <p:spPr/>
-        <p:txBody>
-          <a:bodyPr/>
-          <a:lstStyle/>
-          <a:p>
-            <a:endParaRPr lang="en-US"/>
+        </p:nvPicPr>
+        <p:blipFill>
+          <a:blip r:embed="rId2"/>
+          <a:stretch>
+            <a:fillRect/>
+          </a:stretch>
+        </p:blipFill>
+        <p:spPr>
+          <a:xfrm>
+            <a:off x="1097280" y="1970596"/>
+            <a:ext cx="1828800" cy="1828800"/>
+          </a:xfrm>
+        </p:spPr>
+      </p:pic>
+      <p:sp>
+        <p:nvSpPr>
+          <p:cNvPr id="5" name="TextBox 4">
+            <a:extLst>
+              <a:ext uri="{FF2B5EF4-FFF2-40B4-BE49-F238E27FC236}">
+                <a16:creationId xmlns:a16="http://schemas.microsoft.com/office/drawing/2014/main" id="{EE38B79C-9C8C-2552-6F22-C2A468D12E62}"/>
+              </a:ext>
+            </a:extLst>
+          </p:cNvPr>
+          <p:cNvSpPr txBox="1"/>
+          <p:nvPr/>
+        </p:nvSpPr>
+        <p:spPr>
+          <a:xfrm>
+            <a:off x="3000053" y="1970596"/>
+            <a:ext cx="3431569" cy="1200329"/>
+          </a:xfrm>
+          <a:prstGeom prst="rect">
+            <a:avLst/>
+          </a:prstGeom>
+          <a:noFill/>
+        </p:spPr>
+        <p:txBody>
+          <a:bodyPr wrap="square" rtlCol="0">
+            <a:spAutoFit/>
+          </a:bodyPr>
+          <a:lstStyle/>
+          <a:p>
+            <a:r>
+              <a:rPr lang="en-US" dirty="0"/>
+              <a:t>My personal website/blog with my contact information.</a:t>
+            </a:r>
+            <a:br>
+              <a:rPr lang="en-US" dirty="0"/>
+            </a:br>
+            <a:br>
+              <a:rPr lang="en-US" dirty="0"/>
+            </a:br>
+            <a:r>
+              <a:rPr lang="en-US" dirty="0"/>
+              <a:t>https://samestuffdifferentday.com</a:t>
+            </a:r>
           </a:p>
         </p:txBody>
       </p:sp>
@@ -4441,26 +4465,90 @@
       </p:sp>
       <p:sp>
         <p:nvSpPr>
-          <p:cNvPr id="3" name="Content Placeholder 2">
+          <p:cNvPr id="4" name="TextBox 3">
             <a:extLst>
               <a:ext uri="{FF2B5EF4-FFF2-40B4-BE49-F238E27FC236}">
-                <a16:creationId xmlns:a16="http://schemas.microsoft.com/office/drawing/2014/main" id="{58D192D0-B0DE-DAB7-FE1C-91ABBF4A29B6}"/>
+                <a16:creationId xmlns:a16="http://schemas.microsoft.com/office/drawing/2014/main" id="{8E5C18EE-FF0F-F99E-C73A-1D5A290353E9}"/>
               </a:ext>
             </a:extLst>
           </p:cNvPr>
-          <p:cNvSpPr>
-            <a:spLocks noGrp="1"/>
-          </p:cNvSpPr>
-          <p:nvPr>
-            <p:ph idx="1"/>
-          </p:nvPr>
-        </p:nvSpPr>
-        <p:spPr/>
-        <p:txBody>
-          <a:bodyPr/>
-          <a:lstStyle/>
-          <a:p>
-            <a:endParaRPr lang="en-US"/>
+          <p:cNvSpPr txBox="1"/>
+          <p:nvPr/>
+        </p:nvSpPr>
+        <p:spPr>
+          <a:xfrm>
+            <a:off x="1212574" y="1908313"/>
+            <a:ext cx="9943106" cy="1754326"/>
+          </a:xfrm>
+          <a:prstGeom prst="rect">
+            <a:avLst/>
+          </a:prstGeom>
+          <a:noFill/>
+        </p:spPr>
+        <p:txBody>
+          <a:bodyPr wrap="square" rtlCol="0">
+            <a:spAutoFit/>
+          </a:bodyPr>
+          <a:lstStyle/>
+          <a:p>
+            <a:pPr marL="285750" indent="-285750">
+              <a:buFont typeface="Arial" panose="020B0604020202020204" pitchFamily="34" charset="0"/>
+              <a:buChar char="•"/>
+            </a:pPr>
+            <a:r>
+              <a:rPr lang="en-US" dirty="0"/>
+              <a:t>Husband</a:t>
+            </a:r>
+          </a:p>
+          <a:p>
+            <a:pPr marL="285750" indent="-285750">
+              <a:buFont typeface="Arial" panose="020B0604020202020204" pitchFamily="34" charset="0"/>
+              <a:buChar char="•"/>
+            </a:pPr>
+            <a:r>
+              <a:rPr lang="en-US" dirty="0"/>
+              <a:t>Father</a:t>
+            </a:r>
+          </a:p>
+          <a:p>
+            <a:pPr marL="285750" indent="-285750">
+              <a:buFont typeface="Arial" panose="020B0604020202020204" pitchFamily="34" charset="0"/>
+              <a:buChar char="•"/>
+            </a:pPr>
+            <a:r>
+              <a:rPr lang="en-US" dirty="0"/>
+              <a:t>Son</a:t>
+            </a:r>
+          </a:p>
+          <a:p>
+            <a:pPr marL="285750" indent="-285750">
+              <a:buFont typeface="Arial" panose="020B0604020202020204" pitchFamily="34" charset="0"/>
+              <a:buChar char="•"/>
+            </a:pPr>
+            <a:r>
+              <a:rPr lang="en-US" dirty="0"/>
+              <a:t>Caretaker of three cats</a:t>
+            </a:r>
+          </a:p>
+          <a:p>
+            <a:pPr marL="285750" indent="-285750">
+              <a:buFont typeface="Arial" panose="020B0604020202020204" pitchFamily="34" charset="0"/>
+              <a:buChar char="•"/>
+            </a:pPr>
+            <a:r>
+              <a:rPr lang="en-US" dirty="0"/>
+              <a:t>Developer with almost 30 years professional experience</a:t>
+            </a:r>
+          </a:p>
+          <a:p>
+            <a:pPr marL="285750" indent="-285750">
+              <a:buFont typeface="Arial" panose="020B0604020202020204" pitchFamily="34" charset="0"/>
+              <a:buChar char="•"/>
+            </a:pPr>
+            <a:r>
+              <a:rPr lang="en-US" dirty="0"/>
+              <a:t>Principal Consultant at Improving</a:t>
+            </a:r>
           </a:p>
         </p:txBody>
       </p:sp>
@@ -4522,28 +4610,303 @@
           </a:p>
         </p:txBody>
       </p:sp>
-      <p:sp>
-        <p:nvSpPr>
-          <p:cNvPr id="3" name="Content Placeholder 2">
+      <p:pic>
+        <p:nvPicPr>
+          <p:cNvPr id="4" name="Picture 3">
             <a:extLst>
               <a:ext uri="{FF2B5EF4-FFF2-40B4-BE49-F238E27FC236}">
-                <a16:creationId xmlns:a16="http://schemas.microsoft.com/office/drawing/2014/main" id="{790A02DB-678C-8778-B010-6A6E5B1D9F9A}"/>
+                <a16:creationId xmlns:a16="http://schemas.microsoft.com/office/drawing/2014/main" id="{7A87CE16-BCBD-2F83-3ABA-27816349FDAF}"/>
               </a:ext>
             </a:extLst>
           </p:cNvPr>
-          <p:cNvSpPr>
-            <a:spLocks noGrp="1"/>
-          </p:cNvSpPr>
-          <p:nvPr>
-            <p:ph idx="1"/>
-          </p:nvPr>
-        </p:nvSpPr>
-        <p:spPr/>
-        <p:txBody>
-          <a:bodyPr/>
-          <a:lstStyle/>
-          <a:p>
-            <a:endParaRPr lang="en-US"/>
+          <p:cNvPicPr>
+            <a:picLocks noChangeAspect="1"/>
+          </p:cNvPicPr>
+          <p:nvPr/>
+        </p:nvPicPr>
+        <p:blipFill>
+          <a:blip r:embed="rId2"/>
+          <a:stretch>
+            <a:fillRect/>
+          </a:stretch>
+        </p:blipFill>
+        <p:spPr>
+          <a:xfrm>
+            <a:off x="9784080" y="1934644"/>
+            <a:ext cx="1371600" cy="1371600"/>
+          </a:xfrm>
+          <a:prstGeom prst="rect">
+            <a:avLst/>
+          </a:prstGeom>
+        </p:spPr>
+      </p:pic>
+      <p:sp>
+        <p:nvSpPr>
+          <p:cNvPr id="5" name="TextBox 4">
+            <a:extLst>
+              <a:ext uri="{FF2B5EF4-FFF2-40B4-BE49-F238E27FC236}">
+                <a16:creationId xmlns:a16="http://schemas.microsoft.com/office/drawing/2014/main" id="{604C8EBA-FBC6-6D28-52C5-FEDEF18DE2C3}"/>
+              </a:ext>
+            </a:extLst>
+          </p:cNvPr>
+          <p:cNvSpPr txBox="1"/>
+          <p:nvPr/>
+        </p:nvSpPr>
+        <p:spPr>
+          <a:xfrm>
+            <a:off x="7307580" y="1934644"/>
+            <a:ext cx="2392165" cy="830997"/>
+          </a:xfrm>
+          <a:prstGeom prst="rect">
+            <a:avLst/>
+          </a:prstGeom>
+          <a:noFill/>
+        </p:spPr>
+        <p:txBody>
+          <a:bodyPr wrap="square" rtlCol="0">
+            <a:spAutoFit/>
+          </a:bodyPr>
+          <a:lstStyle/>
+          <a:p>
+            <a:pPr algn="r"/>
+            <a:r>
+              <a:rPr lang="en-US" sz="1600" dirty="0"/>
+              <a:t>Improving’s website</a:t>
+            </a:r>
+            <a:br>
+              <a:rPr lang="en-US" sz="1600" dirty="0"/>
+            </a:br>
+            <a:br>
+              <a:rPr lang="en-US" sz="1600" dirty="0"/>
+            </a:br>
+            <a:r>
+              <a:rPr lang="en-US" sz="1600" dirty="0"/>
+              <a:t>https://improving.com</a:t>
+            </a:r>
+          </a:p>
+        </p:txBody>
+      </p:sp>
+      <p:pic>
+        <p:nvPicPr>
+          <p:cNvPr id="6" name="Picture 5">
+            <a:extLst>
+              <a:ext uri="{FF2B5EF4-FFF2-40B4-BE49-F238E27FC236}">
+                <a16:creationId xmlns:a16="http://schemas.microsoft.com/office/drawing/2014/main" id="{96C524AB-B4EB-34D6-05BB-C043AE683C1D}"/>
+              </a:ext>
+            </a:extLst>
+          </p:cNvPr>
+          <p:cNvPicPr>
+            <a:picLocks noChangeAspect="1"/>
+          </p:cNvPicPr>
+          <p:nvPr/>
+        </p:nvPicPr>
+        <p:blipFill>
+          <a:blip r:embed="rId3"/>
+          <a:stretch>
+            <a:fillRect/>
+          </a:stretch>
+        </p:blipFill>
+        <p:spPr>
+          <a:xfrm>
+            <a:off x="1140603" y="4434841"/>
+            <a:ext cx="1371600" cy="1371600"/>
+          </a:xfrm>
+          <a:prstGeom prst="rect">
+            <a:avLst/>
+          </a:prstGeom>
+        </p:spPr>
+      </p:pic>
+      <p:sp>
+        <p:nvSpPr>
+          <p:cNvPr id="7" name="TextBox 6">
+            <a:extLst>
+              <a:ext uri="{FF2B5EF4-FFF2-40B4-BE49-F238E27FC236}">
+                <a16:creationId xmlns:a16="http://schemas.microsoft.com/office/drawing/2014/main" id="{07E70089-5C7B-9CC3-4393-E500FE1BEB11}"/>
+              </a:ext>
+            </a:extLst>
+          </p:cNvPr>
+          <p:cNvSpPr txBox="1"/>
+          <p:nvPr/>
+        </p:nvSpPr>
+        <p:spPr>
+          <a:xfrm>
+            <a:off x="2512203" y="4367606"/>
+            <a:ext cx="3104260" cy="1077218"/>
+          </a:xfrm>
+          <a:prstGeom prst="rect">
+            <a:avLst/>
+          </a:prstGeom>
+          <a:noFill/>
+        </p:spPr>
+        <p:txBody>
+          <a:bodyPr wrap="square" rtlCol="0">
+            <a:spAutoFit/>
+          </a:bodyPr>
+          <a:lstStyle/>
+          <a:p>
+            <a:r>
+              <a:rPr lang="en-US" sz="1600" dirty="0"/>
+              <a:t>Improving Careers and Open Positions</a:t>
+            </a:r>
+            <a:br>
+              <a:rPr lang="en-US" sz="1600" dirty="0"/>
+            </a:br>
+            <a:br>
+              <a:rPr lang="en-US" sz="1600" dirty="0"/>
+            </a:br>
+            <a:r>
+              <a:rPr lang="en-US" sz="1600" dirty="0"/>
+              <a:t>https://improving.com/careers</a:t>
+            </a:r>
+          </a:p>
+        </p:txBody>
+      </p:sp>
+      <p:sp>
+        <p:nvSpPr>
+          <p:cNvPr id="9" name="TextBox 8">
+            <a:extLst>
+              <a:ext uri="{FF2B5EF4-FFF2-40B4-BE49-F238E27FC236}">
+                <a16:creationId xmlns:a16="http://schemas.microsoft.com/office/drawing/2014/main" id="{73B332F3-2537-1DAC-D45B-79A2C2A4F147}"/>
+              </a:ext>
+            </a:extLst>
+          </p:cNvPr>
+          <p:cNvSpPr txBox="1"/>
+          <p:nvPr/>
+        </p:nvSpPr>
+        <p:spPr>
+          <a:xfrm>
+            <a:off x="1140603" y="1868365"/>
+            <a:ext cx="5350150" cy="1569660"/>
+          </a:xfrm>
+          <a:prstGeom prst="rect">
+            <a:avLst/>
+          </a:prstGeom>
+          <a:noFill/>
+        </p:spPr>
+        <p:txBody>
+          <a:bodyPr wrap="square">
+            <a:spAutoFit/>
+          </a:bodyPr>
+          <a:lstStyle/>
+          <a:p>
+            <a:r>
+              <a:rPr lang="en-US" sz="1600" dirty="0"/>
+              <a:t>Improving is a </a:t>
+            </a:r>
+            <a:r>
+              <a:rPr lang="en-US" sz="1600" b="1" dirty="0"/>
+              <a:t>modern digital services </a:t>
+            </a:r>
+            <a:r>
+              <a:rPr lang="en-US" sz="1600" dirty="0"/>
+              <a:t>company that offers </a:t>
+            </a:r>
+            <a:r>
+              <a:rPr lang="en-US" sz="1600" dirty="0">
+                <a:hlinkClick r:id="rId4"/>
+              </a:rPr>
+              <a:t>IT consulting</a:t>
+            </a:r>
+            <a:r>
+              <a:rPr lang="en-US" sz="1600" dirty="0"/>
+              <a:t>, </a:t>
+            </a:r>
+            <a:r>
+              <a:rPr lang="en-US" sz="1600" dirty="0">
+                <a:hlinkClick r:id="rId5"/>
+              </a:rPr>
+              <a:t>software development</a:t>
+            </a:r>
+            <a:r>
+              <a:rPr lang="en-US" sz="1600" dirty="0"/>
+              <a:t>, and </a:t>
+            </a:r>
+            <a:r>
+              <a:rPr lang="en-US" sz="1600" dirty="0">
+                <a:hlinkClick r:id="rId6"/>
+              </a:rPr>
+              <a:t>agile training</a:t>
+            </a:r>
+            <a:r>
+              <a:rPr lang="en-US" sz="1600" dirty="0"/>
+              <a:t> across the globe. Our innovative solutions have helped thousands of our clients realize their tactical and strategic business objectives, allowing them to achieve great new heights in a competitive and ever-changing market. </a:t>
+            </a:r>
+          </a:p>
+        </p:txBody>
+      </p:sp>
+      <p:pic>
+        <p:nvPicPr>
+          <p:cNvPr id="10" name="Picture 9">
+            <a:extLst>
+              <a:ext uri="{FF2B5EF4-FFF2-40B4-BE49-F238E27FC236}">
+                <a16:creationId xmlns:a16="http://schemas.microsoft.com/office/drawing/2014/main" id="{182C2245-E029-00F9-22B6-14CC4772C675}"/>
+              </a:ext>
+            </a:extLst>
+          </p:cNvPr>
+          <p:cNvPicPr>
+            <a:picLocks noChangeAspect="1"/>
+          </p:cNvPicPr>
+          <p:nvPr/>
+        </p:nvPicPr>
+        <p:blipFill>
+          <a:blip r:embed="rId7"/>
+          <a:stretch>
+            <a:fillRect/>
+          </a:stretch>
+        </p:blipFill>
+        <p:spPr>
+          <a:xfrm>
+            <a:off x="9869624" y="4367606"/>
+            <a:ext cx="1371600" cy="1371600"/>
+          </a:xfrm>
+          <a:prstGeom prst="rect">
+            <a:avLst/>
+          </a:prstGeom>
+        </p:spPr>
+      </p:pic>
+      <p:sp>
+        <p:nvSpPr>
+          <p:cNvPr id="11" name="TextBox 10">
+            <a:extLst>
+              <a:ext uri="{FF2B5EF4-FFF2-40B4-BE49-F238E27FC236}">
+                <a16:creationId xmlns:a16="http://schemas.microsoft.com/office/drawing/2014/main" id="{90726961-15EC-0582-E687-B2E322379CD5}"/>
+              </a:ext>
+            </a:extLst>
+          </p:cNvPr>
+          <p:cNvSpPr txBox="1"/>
+          <p:nvPr/>
+        </p:nvSpPr>
+        <p:spPr>
+          <a:xfrm>
+            <a:off x="5745631" y="4367606"/>
+            <a:ext cx="4038449" cy="830997"/>
+          </a:xfrm>
+          <a:prstGeom prst="rect">
+            <a:avLst/>
+          </a:prstGeom>
+          <a:noFill/>
+        </p:spPr>
+        <p:txBody>
+          <a:bodyPr wrap="square" rtlCol="0">
+            <a:spAutoFit/>
+          </a:bodyPr>
+          <a:lstStyle/>
+          <a:p>
+            <a:pPr algn="r"/>
+            <a:r>
+              <a:rPr lang="en-US" sz="1600" dirty="0"/>
+              <a:t>Improving Training and Upcoming Classes</a:t>
+            </a:r>
+            <a:br>
+              <a:rPr lang="en-US" sz="1600" dirty="0"/>
+            </a:br>
+            <a:br>
+              <a:rPr lang="en-US" sz="1600" dirty="0"/>
+            </a:br>
+            <a:r>
+              <a:rPr lang="en-US" sz="1600" dirty="0"/>
+              <a:t>https://improving.com/services/training/</a:t>
+            </a:r>
           </a:p>
         </p:txBody>
       </p:sp>
@@ -4626,7 +4989,7 @@
           <a:bodyPr/>
           <a:lstStyle/>
           <a:p>
-            <a:endParaRPr lang="en-US"/>
+            <a:endParaRPr lang="en-US" dirty="0"/>
           </a:p>
         </p:txBody>
       </p:sp>
@@ -5339,4 +5702,24 @@
     </a:ext>
   </a:extLst>
 </a:theme>
+</file>
+
+<file path=ppt/webextensions/taskpanes.xml><?xml version="1.0" encoding="utf-8"?>
+<wetp:taskpanes xmlns:wetp="http://schemas.microsoft.com/office/webextensions/taskpanes/2010/11">
+  <wetp:taskpane dockstate="right" visibility="1" width="350" row="2">
+    <wetp:webextensionref xmlns:r="http://schemas.openxmlformats.org/officeDocument/2006/relationships" r:id="rId1"/>
+  </wetp:taskpane>
+</wetp:taskpanes>
+</file>
+
+<file path=ppt/webextensions/webextension1.xml><?xml version="1.0" encoding="utf-8"?>
+<we:webextension xmlns:we="http://schemas.microsoft.com/office/webextensions/webextension/2010/11" id="{024B0A7C-48A8-41D5-86A9-145171BB3488}">
+  <we:reference id="wa104051163" version="1.2.0.3" store="en-US" storeType="OMEX"/>
+  <we:alternateReferences>
+    <we:reference id="WA104051163" version="1.2.0.3" store="WA104051163" storeType="OMEX"/>
+  </we:alternateReferences>
+  <we:properties/>
+  <we:bindings/>
+  <we:snapshot xmlns:r="http://schemas.openxmlformats.org/officeDocument/2006/relationships"/>
+</we:webextension>
 </file>
</xml_diff>